<commit_message>
Fixes to key mgmt
</commit_message>
<xml_diff>
--- a/slides/module-1-overview.pptx
+++ b/slides/module-1-overview.pptx
@@ -216,7 +216,7 @@
           <a:p>
             <a:fld id="{56E592D9-FAC2-4174-B354-B1C57D4DE40F}" type="datetimeFigureOut">
               <a:rPr lang="en-US" smtClean="0"/>
-              <a:t>10/31/15</a:t>
+              <a:t>3/20/16</a:t>
             </a:fld>
             <a:endParaRPr lang="en-US"/>
           </a:p>
@@ -932,7 +932,7 @@
           <a:p>
             <a:fld id="{AD706CFD-827E-4D2E-A90D-56E23410CEDA}" type="datetimeFigureOut">
               <a:rPr lang="en-US" smtClean="0"/>
-              <a:t>10/31/15</a:t>
+              <a:t>3/20/16</a:t>
             </a:fld>
             <a:endParaRPr lang="en-US"/>
           </a:p>
@@ -1109,7 +1109,7 @@
           <a:p>
             <a:fld id="{AD706CFD-827E-4D2E-A90D-56E23410CEDA}" type="datetimeFigureOut">
               <a:rPr lang="en-US" smtClean="0"/>
-              <a:t>10/31/15</a:t>
+              <a:t>3/20/16</a:t>
             </a:fld>
             <a:endParaRPr lang="en-US"/>
           </a:p>
@@ -1289,7 +1289,7 @@
           <a:p>
             <a:fld id="{AD706CFD-827E-4D2E-A90D-56E23410CEDA}" type="datetimeFigureOut">
               <a:rPr lang="en-US" smtClean="0"/>
-              <a:t>10/31/15</a:t>
+              <a:t>3/20/16</a:t>
             </a:fld>
             <a:endParaRPr lang="en-US"/>
           </a:p>
@@ -1481,7 +1481,7 @@
           <a:p>
             <a:fld id="{AD706CFD-827E-4D2E-A90D-56E23410CEDA}" type="datetimeFigureOut">
               <a:rPr lang="en-US" smtClean="0"/>
-              <a:t>10/31/15</a:t>
+              <a:t>3/20/16</a:t>
             </a:fld>
             <a:endParaRPr lang="en-US"/>
           </a:p>
@@ -1734,7 +1734,7 @@
           <a:p>
             <a:fld id="{AD706CFD-827E-4D2E-A90D-56E23410CEDA}" type="datetimeFigureOut">
               <a:rPr lang="en-US" smtClean="0"/>
-              <a:t>10/31/15</a:t>
+              <a:t>3/20/16</a:t>
             </a:fld>
             <a:endParaRPr lang="en-US"/>
           </a:p>
@@ -2022,7 +2022,7 @@
           <a:p>
             <a:fld id="{AD706CFD-827E-4D2E-A90D-56E23410CEDA}" type="datetimeFigureOut">
               <a:rPr lang="en-US" smtClean="0"/>
-              <a:t>10/31/15</a:t>
+              <a:t>3/20/16</a:t>
             </a:fld>
             <a:endParaRPr lang="en-US"/>
           </a:p>
@@ -2449,7 +2449,7 @@
           <a:p>
             <a:fld id="{AD706CFD-827E-4D2E-A90D-56E23410CEDA}" type="datetimeFigureOut">
               <a:rPr lang="en-US" smtClean="0"/>
-              <a:t>10/31/15</a:t>
+              <a:t>3/20/16</a:t>
             </a:fld>
             <a:endParaRPr lang="en-US"/>
           </a:p>
@@ -2567,7 +2567,7 @@
           <a:p>
             <a:fld id="{AD706CFD-827E-4D2E-A90D-56E23410CEDA}" type="datetimeFigureOut">
               <a:rPr lang="en-US" smtClean="0"/>
-              <a:t>10/31/15</a:t>
+              <a:t>3/20/16</a:t>
             </a:fld>
             <a:endParaRPr lang="en-US"/>
           </a:p>
@@ -2669,7 +2669,7 @@
           <a:p>
             <a:fld id="{AD706CFD-827E-4D2E-A90D-56E23410CEDA}" type="datetimeFigureOut">
               <a:rPr lang="en-US" smtClean="0"/>
-              <a:t>10/31/15</a:t>
+              <a:t>3/20/16</a:t>
             </a:fld>
             <a:endParaRPr lang="en-US"/>
           </a:p>
@@ -2946,7 +2946,7 @@
           <a:p>
             <a:fld id="{AD706CFD-827E-4D2E-A90D-56E23410CEDA}" type="datetimeFigureOut">
               <a:rPr lang="en-US" smtClean="0"/>
-              <a:t>10/31/15</a:t>
+              <a:t>3/20/16</a:t>
             </a:fld>
             <a:endParaRPr lang="en-US"/>
           </a:p>
@@ -3199,7 +3199,7 @@
           <a:p>
             <a:fld id="{AD706CFD-827E-4D2E-A90D-56E23410CEDA}" type="datetimeFigureOut">
               <a:rPr lang="en-US" smtClean="0"/>
-              <a:t>10/31/15</a:t>
+              <a:t>3/20/16</a:t>
             </a:fld>
             <a:endParaRPr lang="en-US"/>
           </a:p>
@@ -3412,7 +3412,7 @@
           <a:p>
             <a:fld id="{AD706CFD-827E-4D2E-A90D-56E23410CEDA}" type="datetimeFigureOut">
               <a:rPr lang="en-US" smtClean="0"/>
-              <a:t>10/31/15</a:t>
+              <a:t>3/20/16</a:t>
             </a:fld>
             <a:endParaRPr lang="en-US"/>
           </a:p>
@@ -5542,13 +5542,6 @@
               </a:rPr>
               <a:t>capabilities</a:t>
             </a:r>
-            <a:endParaRPr lang="en-US" sz="2800" i="1" dirty="0" smtClean="0">
-              <a:solidFill>
-                <a:srgbClr val="000000"/>
-              </a:solidFill>
-              <a:ea typeface="Verdana" panose="020B0604030504040204" pitchFamily="34" charset="0"/>
-              <a:cs typeface="Calibri Light"/>
-            </a:endParaRPr>
           </a:p>
         </p:txBody>
       </p:sp>
@@ -5693,20 +5686,7 @@
                 <a:latin typeface="+mn-lt"/>
                 <a:cs typeface="Calibri Light"/>
               </a:rPr>
-              <a:t>NETCONF </a:t>
-            </a:r>
-            <a:r>
-              <a:rPr lang="en-US" sz="4600" dirty="0" smtClean="0">
-                <a:solidFill>
-                  <a:schemeClr val="tx1">
-                    <a:lumMod val="90000"/>
-                    <a:lumOff val="10000"/>
-                  </a:schemeClr>
-                </a:solidFill>
-                <a:latin typeface="+mn-lt"/>
-                <a:cs typeface="Calibri Light"/>
-              </a:rPr>
-              <a:t>Capabilities</a:t>
+              <a:t>NETCONF Capabilities</a:t>
             </a:r>
             <a:endParaRPr lang="en-US" sz="4600" dirty="0">
               <a:solidFill>
@@ -11405,10 +11385,10 @@
                 </a:solidFill>
                 <a:cs typeface="Calibri Light"/>
               </a:rPr>
-              <a:t> 	             &lt;cancel-commit</a:t>
-            </a:r>
-            <a:r>
-              <a:rPr lang="en-US" sz="3000" dirty="0">
+              <a:t> 	             </a:t>
+            </a:r>
+            <a:r>
+              <a:rPr lang="en-US" sz="3000" dirty="0" smtClean="0">
                 <a:solidFill>
                   <a:schemeClr val="tx1">
                     <a:lumMod val="90000"/>
@@ -11417,8 +11397,17 @@
                 </a:solidFill>
                 <a:cs typeface="Calibri Light"/>
               </a:rPr>
-              <a:t>&gt;</a:t>
-            </a:r>
+              <a:t>      &lt;validate&gt;</a:t>
+            </a:r>
+            <a:endParaRPr lang="en-US" sz="3000" dirty="0">
+              <a:solidFill>
+                <a:schemeClr val="tx1">
+                  <a:lumMod val="90000"/>
+                  <a:lumOff val="10000"/>
+                </a:schemeClr>
+              </a:solidFill>
+              <a:cs typeface="Calibri Light"/>
+            </a:endParaRPr>
           </a:p>
           <a:p>
             <a:pPr marL="0" indent="0">
@@ -11607,8 +11596,8 @@
         </p:nvSpPr>
         <p:spPr>
           <a:xfrm>
-            <a:off x="10119359" y="4964370"/>
-            <a:ext cx="3657601" cy="2308324"/>
+            <a:off x="9753601" y="4964370"/>
+            <a:ext cx="4023360" cy="1938992"/>
           </a:xfrm>
           <a:prstGeom prst="rect">
             <a:avLst/>
@@ -13056,33 +13045,7 @@
                 <a:latin typeface="+mn-lt"/>
                 <a:cs typeface="Calibri Light"/>
               </a:rPr>
-              <a:t>NETCONF </a:t>
-            </a:r>
-            <a:r>
-              <a:rPr lang="en-US" dirty="0" smtClean="0">
-                <a:solidFill>
-                  <a:schemeClr val="tx1">
-                    <a:lumMod val="90000"/>
-                    <a:lumOff val="10000"/>
-                  </a:schemeClr>
-                </a:solidFill>
-                <a:latin typeface="+mn-lt"/>
-                <a:cs typeface="Calibri Light"/>
-              </a:rPr>
-              <a:t>and </a:t>
-            </a:r>
-            <a:r>
-              <a:rPr lang="en-US" dirty="0" smtClean="0">
-                <a:solidFill>
-                  <a:schemeClr val="tx1">
-                    <a:lumMod val="90000"/>
-                    <a:lumOff val="10000"/>
-                  </a:schemeClr>
-                </a:solidFill>
-                <a:latin typeface="+mn-lt"/>
-                <a:cs typeface="Calibri Light"/>
-              </a:rPr>
-              <a:t>YANG</a:t>
+              <a:t>NETCONF and YANG</a:t>
             </a:r>
             <a:endParaRPr lang="en-US" dirty="0">
               <a:latin typeface="+mn-lt"/>
@@ -13125,12 +13088,6 @@
               </a:rPr>
               <a:t>NETCONF</a:t>
             </a:r>
-            <a:endParaRPr lang="en-US" sz="3200" dirty="0" smtClean="0">
-              <a:solidFill>
-                <a:srgbClr val="0F142A"/>
-              </a:solidFill>
-              <a:cs typeface="Calibri"/>
-            </a:endParaRPr>
           </a:p>
         </p:txBody>
       </p:sp>
@@ -13346,12 +13303,6 @@
               </a:rPr>
               <a:t>YANG </a:t>
             </a:r>
-            <a:endParaRPr lang="en-US" sz="3200" dirty="0" smtClean="0">
-              <a:solidFill>
-                <a:srgbClr val="0F142A"/>
-              </a:solidFill>
-              <a:cs typeface="Calibri"/>
-            </a:endParaRPr>
           </a:p>
         </p:txBody>
       </p:sp>
@@ -13418,10 +13369,10 @@
                 </a:solidFill>
                 <a:cs typeface="Calibri Light"/>
               </a:rPr>
-              <a:t>install</a:t>
-            </a:r>
-            <a:r>
-              <a:rPr lang="en-US" dirty="0" smtClean="0">
+              <a:t>install, manipulate</a:t>
+            </a:r>
+            <a:r>
+              <a:rPr lang="en-US" dirty="0">
                 <a:solidFill>
                   <a:schemeClr val="tx1">
                     <a:lumMod val="90000"/>
@@ -13430,10 +13381,10 @@
                 </a:solidFill>
                 <a:cs typeface="Calibri Light"/>
               </a:rPr>
-              <a:t>, manipulate</a:t>
-            </a:r>
-            <a:r>
-              <a:rPr lang="en-US" dirty="0">
+              <a:t>, and delete the configuration </a:t>
+            </a:r>
+            <a:r>
+              <a:rPr lang="en-US" dirty="0" smtClean="0">
                 <a:solidFill>
                   <a:schemeClr val="tx1">
                     <a:lumMod val="90000"/>
@@ -13442,10 +13393,10 @@
                 </a:solidFill>
                 <a:cs typeface="Calibri Light"/>
               </a:rPr>
-              <a:t>, and delete the configuration </a:t>
-            </a:r>
-            <a:r>
-              <a:rPr lang="en-US" dirty="0" smtClean="0">
+              <a:t>of </a:t>
+            </a:r>
+            <a:r>
+              <a:rPr lang="en-US" dirty="0">
                 <a:solidFill>
                   <a:schemeClr val="tx1">
                     <a:lumMod val="90000"/>
@@ -13454,10 +13405,10 @@
                 </a:solidFill>
                 <a:cs typeface="Calibri Light"/>
               </a:rPr>
-              <a:t>of </a:t>
-            </a:r>
-            <a:r>
-              <a:rPr lang="en-US" dirty="0">
+              <a:t>network </a:t>
+            </a:r>
+            <a:r>
+              <a:rPr lang="en-US" dirty="0" smtClean="0">
                 <a:solidFill>
                   <a:schemeClr val="tx1">
                     <a:lumMod val="90000"/>
@@ -13466,29 +13417,8 @@
                 </a:solidFill>
                 <a:cs typeface="Calibri Light"/>
               </a:rPr>
-              <a:t>network </a:t>
-            </a:r>
-            <a:r>
-              <a:rPr lang="en-US" dirty="0" smtClean="0">
-                <a:solidFill>
-                  <a:schemeClr val="tx1">
-                    <a:lumMod val="90000"/>
-                    <a:lumOff val="10000"/>
-                  </a:schemeClr>
-                </a:solidFill>
-                <a:cs typeface="Calibri Light"/>
-              </a:rPr>
               <a:t>devices</a:t>
             </a:r>
-            <a:endParaRPr lang="en-US" dirty="0" smtClean="0">
-              <a:solidFill>
-                <a:schemeClr val="tx1">
-                  <a:lumMod val="90000"/>
-                  <a:lumOff val="10000"/>
-                </a:schemeClr>
-              </a:solidFill>
-              <a:cs typeface="Calibri Light"/>
-            </a:endParaRPr>
           </a:p>
           <a:p>
             <a:pPr marL="457200" indent="-457200">
@@ -17174,20 +17104,7 @@
                 <a:latin typeface="+mn-lt"/>
                 <a:cs typeface="Calibri Light"/>
               </a:rPr>
-              <a:t>NETCONF </a:t>
-            </a:r>
-            <a:r>
-              <a:rPr lang="en-US" sz="4600" smtClean="0">
-                <a:solidFill>
-                  <a:schemeClr val="tx1">
-                    <a:lumMod val="90000"/>
-                    <a:lumOff val="10000"/>
-                  </a:schemeClr>
-                </a:solidFill>
-                <a:latin typeface="+mn-lt"/>
-                <a:cs typeface="Calibri Light"/>
-              </a:rPr>
-              <a:t>and YANG </a:t>
+              <a:t>NETCONF and YANG </a:t>
             </a:r>
             <a:r>
               <a:rPr lang="en-US" sz="4600" dirty="0" smtClean="0">

</xml_diff>